<commit_message>
Adjust positions and fix all bugs
</commit_message>
<xml_diff>
--- a/Documents/YRT.pptx
+++ b/Documents/YRT.pptx
@@ -5,42 +5,39 @@
     <p:sldMasterId id="2147483698" r:id="rId1"/>
   </p:sldMasterIdLst>
   <p:notesMasterIdLst>
-    <p:notesMasterId r:id="rId7"/>
+    <p:notesMasterId r:id="rId8"/>
   </p:notesMasterIdLst>
   <p:sldIdLst>
     <p:sldId id="256" r:id="rId2"/>
     <p:sldId id="263" r:id="rId3"/>
-    <p:sldId id="258" r:id="rId4"/>
-    <p:sldId id="264" r:id="rId5"/>
-    <p:sldId id="262" r:id="rId6"/>
+    <p:sldId id="264" r:id="rId4"/>
+    <p:sldId id="258" r:id="rId5"/>
+    <p:sldId id="265" r:id="rId6"/>
+    <p:sldId id="262" r:id="rId7"/>
   </p:sldIdLst>
   <p:sldSz cx="9144000" cy="5143500" type="screen16x9"/>
   <p:notesSz cx="6858000" cy="9144000"/>
   <p:embeddedFontLst>
     <p:embeddedFont>
-      <p:font typeface="Titillium Web" charset="0"/>
-      <p:regular r:id="rId8"/>
-      <p:bold r:id="rId9"/>
-      <p:italic r:id="rId10"/>
-      <p:boldItalic r:id="rId11"/>
+      <p:font typeface="Montserrat" panose="00000500000000000000" pitchFamily="2" charset="0"/>
+      <p:regular r:id="rId9"/>
+      <p:bold r:id="rId10"/>
+      <p:italic r:id="rId11"/>
+      <p:boldItalic r:id="rId12"/>
     </p:embeddedFont>
     <p:embeddedFont>
-      <p:font typeface="Titillium Web Light" charset="0"/>
-      <p:regular r:id="rId12"/>
-      <p:bold r:id="rId13"/>
-      <p:italic r:id="rId14"/>
-      <p:boldItalic r:id="rId15"/>
+      <p:font typeface="Titillium Web" panose="00000500000000000000" pitchFamily="2" charset="0"/>
+      <p:regular r:id="rId13"/>
+      <p:bold r:id="rId14"/>
+      <p:italic r:id="rId15"/>
+      <p:boldItalic r:id="rId16"/>
     </p:embeddedFont>
     <p:embeddedFont>
-      <p:font typeface="Montserrat" charset="-52"/>
-      <p:regular r:id="rId16"/>
-      <p:bold r:id="rId17"/>
-      <p:italic r:id="rId18"/>
-      <p:boldItalic r:id="rId19"/>
-    </p:embeddedFont>
-    <p:embeddedFont>
-      <p:font typeface="Bebas Neue" charset="0"/>
-      <p:regular r:id="rId20"/>
+      <p:font typeface="Titillium Web Light" panose="00000400000000000000" pitchFamily="2" charset="0"/>
+      <p:regular r:id="rId17"/>
+      <p:bold r:id="rId18"/>
+      <p:italic r:id="rId19"/>
+      <p:boldItalic r:id="rId20"/>
     </p:embeddedFont>
   </p:embeddedFontLst>
   <p:defaultTextStyle>
@@ -274,7 +271,7 @@
   </p:defaultTextStyle>
   <p:extLst>
     <p:ext uri="{EFAFB233-063F-42B5-8137-9DF3F51BA10A}">
-      <p15:sldGuideLst xmlns="" xmlns:mc="http://schemas.openxmlformats.org/markup-compatibility/2006" xmlns:mv="urn:schemas-microsoft-com:mac:vml" xmlns:c="http://schemas.openxmlformats.org/drawingml/2006/chart" xmlns:dgm="http://schemas.openxmlformats.org/drawingml/2006/diagram" xmlns:o="urn:schemas-microsoft-com:office:office" xmlns:v="urn:schemas-microsoft-com:vml" xmlns:pvml="urn:schemas-microsoft-com:office:powerpoint" xmlns:com="http://schemas.openxmlformats.org/drawingml/2006/compatibility" xmlns:p14="http://schemas.microsoft.com/office/powerpoint/2010/main" xmlns:p15="http://schemas.microsoft.com/office/powerpoint/2012/main" xmlns:ahyp="http://schemas.microsoft.com/office/drawing/2018/hyperlinkcolor">
+      <p15:sldGuideLst xmlns:p15="http://schemas.microsoft.com/office/powerpoint/2012/main">
         <p15:guide id="1" orient="horz" pos="1620">
           <p15:clr>
             <a:srgbClr val="9AA0A6"/>
@@ -289,6 +286,16 @@
     </p:ext>
   </p:extLst>
 </p:presentation>
+</file>
+
+<file path=ppt/revisionInfo.xml><?xml version="1.0" encoding="utf-8"?>
+<p1510:revInfo xmlns:a="http://schemas.openxmlformats.org/drawingml/2006/main" xmlns:r="http://schemas.openxmlformats.org/officeDocument/2006/relationships" xmlns:p1510="http://schemas.microsoft.com/office/powerpoint/2015/10/main">
+  <p1510:revLst>
+    <p1510:client id="{35C9EE6A-DA25-4950-92FC-D24C1139DFBD}" v="85" dt="2024-01-14T19:11:17.525"/>
+    <p1510:client id="{835ECC3B-60D3-FBA2-5D5F-5422A58F4014}" v="46" dt="2024-01-14T22:00:02.575"/>
+    <p1510:client id="{FAEE2D84-888C-F42E-1932-733A5D5EFF11}" v="130" dt="2024-01-14T23:51:52.219"/>
+  </p1510:revLst>
+</p1510:revInfo>
 </file>
 
 <file path=ppt/notesMasters/notesMaster1.xml><?xml version="1.0" encoding="utf-8"?>
@@ -945,6 +952,110 @@
   <p:cSld>
     <p:spTree>
       <p:nvGrpSpPr>
+        <p:cNvPr id="1" name="Shape 1531"/>
+        <p:cNvGrpSpPr/>
+        <p:nvPr/>
+      </p:nvGrpSpPr>
+      <p:grpSpPr>
+        <a:xfrm>
+          <a:off x="0" y="0"/>
+          <a:ext cx="0" cy="0"/>
+          <a:chOff x="0" y="0"/>
+          <a:chExt cx="0" cy="0"/>
+        </a:xfrm>
+      </p:grpSpPr>
+      <p:sp>
+        <p:nvSpPr>
+          <p:cNvPr id="1532" name="Google Shape;1532;gcb597d6056_0_87:notes"/>
+          <p:cNvSpPr>
+            <a:spLocks noGrp="1" noRot="1" noChangeAspect="1"/>
+          </p:cNvSpPr>
+          <p:nvPr>
+            <p:ph type="sldImg" idx="2"/>
+          </p:nvPr>
+        </p:nvSpPr>
+        <p:spPr>
+          <a:xfrm>
+            <a:off x="381000" y="685800"/>
+            <a:ext cx="6096000" cy="3429000"/>
+          </a:xfrm>
+          <a:custGeom>
+            <a:avLst/>
+            <a:gdLst/>
+            <a:ahLst/>
+            <a:cxnLst/>
+            <a:rect l="l" t="t" r="r" b="b"/>
+            <a:pathLst>
+              <a:path w="120000" h="120000" extrusionOk="0">
+                <a:moveTo>
+                  <a:pt x="0" y="0"/>
+                </a:moveTo>
+                <a:lnTo>
+                  <a:pt x="120000" y="0"/>
+                </a:lnTo>
+                <a:lnTo>
+                  <a:pt x="120000" y="120000"/>
+                </a:lnTo>
+                <a:lnTo>
+                  <a:pt x="0" y="120000"/>
+                </a:lnTo>
+                <a:close/>
+              </a:path>
+            </a:pathLst>
+          </a:custGeom>
+        </p:spPr>
+      </p:sp>
+      <p:sp>
+        <p:nvSpPr>
+          <p:cNvPr id="1533" name="Google Shape;1533;gcb597d6056_0_87:notes"/>
+          <p:cNvSpPr txBox="1">
+            <a:spLocks noGrp="1"/>
+          </p:cNvSpPr>
+          <p:nvPr>
+            <p:ph type="body" idx="1"/>
+          </p:nvPr>
+        </p:nvSpPr>
+        <p:spPr>
+          <a:xfrm>
+            <a:off x="685800" y="4343400"/>
+            <a:ext cx="5486400" cy="4114800"/>
+          </a:xfrm>
+          <a:prstGeom prst="rect">
+            <a:avLst/>
+          </a:prstGeom>
+        </p:spPr>
+        <p:txBody>
+          <a:bodyPr spcFirstLastPara="1" wrap="square" lIns="91425" tIns="91425" rIns="91425" bIns="91425" anchor="t" anchorCtr="0">
+            <a:noAutofit/>
+          </a:bodyPr>
+          <a:lstStyle/>
+          <a:p>
+            <a:pPr marL="0" lvl="0" indent="0" algn="l" rtl="0">
+              <a:spcBef>
+                <a:spcPts val="0"/>
+              </a:spcBef>
+              <a:spcAft>
+                <a:spcPts val="0"/>
+              </a:spcAft>
+              <a:buNone/>
+            </a:pPr>
+            <a:endParaRPr/>
+          </a:p>
+        </p:txBody>
+      </p:sp>
+    </p:spTree>
+  </p:cSld>
+  <p:clrMapOvr>
+    <a:masterClrMapping/>
+  </p:clrMapOvr>
+</p:notes>
+</file>
+
+<file path=ppt/notesSlides/notesSlide4.xml><?xml version="1.0" encoding="utf-8"?>
+<p:notes xmlns:a="http://schemas.openxmlformats.org/drawingml/2006/main" xmlns:r="http://schemas.openxmlformats.org/officeDocument/2006/relationships" xmlns:p="http://schemas.openxmlformats.org/presentationml/2006/main" showMasterSp="0" showMasterPhAnim="0">
+  <p:cSld>
+    <p:spTree>
+      <p:nvGrpSpPr>
         <p:cNvPr id="1" name="Shape 1114"/>
         <p:cNvGrpSpPr/>
         <p:nvPr/>
@@ -1001,110 +1112,6 @@
       <p:sp>
         <p:nvSpPr>
           <p:cNvPr id="1116" name="Google Shape;1116;gfad2331100_0_734:notes"/>
-          <p:cNvSpPr txBox="1">
-            <a:spLocks noGrp="1"/>
-          </p:cNvSpPr>
-          <p:nvPr>
-            <p:ph type="body" idx="1"/>
-          </p:nvPr>
-        </p:nvSpPr>
-        <p:spPr>
-          <a:xfrm>
-            <a:off x="685800" y="4343400"/>
-            <a:ext cx="5486400" cy="4114800"/>
-          </a:xfrm>
-          <a:prstGeom prst="rect">
-            <a:avLst/>
-          </a:prstGeom>
-        </p:spPr>
-        <p:txBody>
-          <a:bodyPr spcFirstLastPara="1" wrap="square" lIns="91425" tIns="91425" rIns="91425" bIns="91425" anchor="t" anchorCtr="0">
-            <a:noAutofit/>
-          </a:bodyPr>
-          <a:lstStyle/>
-          <a:p>
-            <a:pPr marL="0" lvl="0" indent="0" algn="l" rtl="0">
-              <a:spcBef>
-                <a:spcPts val="0"/>
-              </a:spcBef>
-              <a:spcAft>
-                <a:spcPts val="0"/>
-              </a:spcAft>
-              <a:buNone/>
-            </a:pPr>
-            <a:endParaRPr/>
-          </a:p>
-        </p:txBody>
-      </p:sp>
-    </p:spTree>
-  </p:cSld>
-  <p:clrMapOvr>
-    <a:masterClrMapping/>
-  </p:clrMapOvr>
-</p:notes>
-</file>
-
-<file path=ppt/notesSlides/notesSlide4.xml><?xml version="1.0" encoding="utf-8"?>
-<p:notes xmlns:a="http://schemas.openxmlformats.org/drawingml/2006/main" xmlns:r="http://schemas.openxmlformats.org/officeDocument/2006/relationships" xmlns:p="http://schemas.openxmlformats.org/presentationml/2006/main" showMasterSp="0" showMasterPhAnim="0">
-  <p:cSld>
-    <p:spTree>
-      <p:nvGrpSpPr>
-        <p:cNvPr id="1" name="Shape 1531"/>
-        <p:cNvGrpSpPr/>
-        <p:nvPr/>
-      </p:nvGrpSpPr>
-      <p:grpSpPr>
-        <a:xfrm>
-          <a:off x="0" y="0"/>
-          <a:ext cx="0" cy="0"/>
-          <a:chOff x="0" y="0"/>
-          <a:chExt cx="0" cy="0"/>
-        </a:xfrm>
-      </p:grpSpPr>
-      <p:sp>
-        <p:nvSpPr>
-          <p:cNvPr id="1532" name="Google Shape;1532;gcb597d6056_0_87:notes"/>
-          <p:cNvSpPr>
-            <a:spLocks noGrp="1" noRot="1" noChangeAspect="1"/>
-          </p:cNvSpPr>
-          <p:nvPr>
-            <p:ph type="sldImg" idx="2"/>
-          </p:nvPr>
-        </p:nvSpPr>
-        <p:spPr>
-          <a:xfrm>
-            <a:off x="381000" y="685800"/>
-            <a:ext cx="6096000" cy="3429000"/>
-          </a:xfrm>
-          <a:custGeom>
-            <a:avLst/>
-            <a:gdLst/>
-            <a:ahLst/>
-            <a:cxnLst/>
-            <a:rect l="l" t="t" r="r" b="b"/>
-            <a:pathLst>
-              <a:path w="120000" h="120000" extrusionOk="0">
-                <a:moveTo>
-                  <a:pt x="0" y="0"/>
-                </a:moveTo>
-                <a:lnTo>
-                  <a:pt x="120000" y="0"/>
-                </a:lnTo>
-                <a:lnTo>
-                  <a:pt x="120000" y="120000"/>
-                </a:lnTo>
-                <a:lnTo>
-                  <a:pt x="0" y="120000"/>
-                </a:lnTo>
-                <a:close/>
-              </a:path>
-            </a:pathLst>
-          </a:custGeom>
-        </p:spPr>
-      </p:sp>
-      <p:sp>
-        <p:nvSpPr>
-          <p:cNvPr id="1533" name="Google Shape;1533;gcb597d6056_0_87:notes"/>
           <p:cNvSpPr txBox="1">
             <a:spLocks noGrp="1"/>
           </p:cNvSpPr>
@@ -10195,7 +10202,7 @@
               <a:buNone/>
             </a:pPr>
             <a:r>
-              <a:rPr lang="en" sz="6144" dirty="0" smtClean="0">
+              <a:rPr lang="en" sz="6144" dirty="0">
                 <a:solidFill>
                   <a:schemeClr val="accent4"/>
                 </a:solidFill>
@@ -10249,7 +10256,7 @@
               <a:buNone/>
             </a:pPr>
             <a:r>
-              <a:rPr lang="en-US" dirty="0" smtClean="0"/>
+              <a:rPr lang="en-US" dirty="0"/>
               <a:t>About our team</a:t>
             </a:r>
             <a:endParaRPr dirty="0"/>
@@ -34964,7 +34971,7 @@
         </p:nvSpPr>
         <p:spPr>
           <a:xfrm>
-            <a:off x="720000" y="445025"/>
+            <a:off x="720000" y="45664"/>
             <a:ext cx="7704000" cy="572700"/>
           </a:xfrm>
           <a:prstGeom prst="rect">
@@ -34987,7 +34994,7 @@
               <a:buNone/>
             </a:pPr>
             <a:r>
-              <a:rPr lang="en" dirty="0" smtClean="0"/>
+              <a:rPr lang="en" dirty="0"/>
               <a:t>Team members</a:t>
             </a:r>
             <a:endParaRPr dirty="0"/>
@@ -35029,7 +35036,7 @@
               <a:buNone/>
             </a:pPr>
             <a:r>
-              <a:rPr lang="en" sz="2200" b="1" dirty="0" smtClean="0">
+              <a:rPr lang="en" sz="2200" b="1" dirty="0">
                 <a:solidFill>
                   <a:schemeClr val="dk1"/>
                 </a:solidFill>
@@ -35060,7 +35067,7 @@
         </p:nvSpPr>
         <p:spPr>
           <a:xfrm>
-            <a:off x="750891" y="1728793"/>
+            <a:off x="744005" y="1728793"/>
             <a:ext cx="3073525" cy="852900"/>
           </a:xfrm>
           <a:prstGeom prst="rect">
@@ -35087,7 +35094,26 @@
               <a:buNone/>
             </a:pPr>
             <a:r>
-              <a:rPr lang="en" dirty="0" smtClean="0">
+              <a:rPr lang="en" dirty="0">
+                <a:solidFill>
+                  <a:schemeClr val="dk1"/>
+                </a:solidFill>
+                <a:latin typeface="Montserrat"/>
+                <a:ea typeface="Montserrat"/>
+                <a:cs typeface="Montserrat"/>
+                <a:sym typeface="Montserrat"/>
+                <a:hlinkClick r:id="rId3">
+                  <a:extLst>
+                    <a:ext uri="{A12FA001-AC4F-418D-AE19-62706E023703}">
+                      <ahyp:hlinkClr xmlns:ahyp="http://schemas.microsoft.com/office/drawing/2018/hyperlinkcolor" val="tx"/>
+                    </a:ext>
+                  </a:extLst>
+                </a:hlinkClick>
+              </a:rPr>
+              <a:t>IVAndreev21@codingburgas.</a:t>
+            </a:r>
+            <a:r>
+              <a:rPr lang="en" dirty="0">
                 <a:solidFill>
                   <a:schemeClr val="dk1"/>
                 </a:solidFill>
@@ -35097,30 +35123,10 @@
                 <a:sym typeface="Montserrat"/>
                 <a:hlinkClick r:id="rId3"/>
               </a:rPr>
-              <a:t>IVAndreev21@codingburgas.bg</a:t>
+              <a:t>bg</a:t>
             </a:r>
-            <a:endParaRPr lang="en" dirty="0" smtClean="0">
-              <a:solidFill>
-                <a:schemeClr val="dk1"/>
-              </a:solidFill>
-              <a:latin typeface="Montserrat"/>
-              <a:ea typeface="Montserrat"/>
-              <a:cs typeface="Montserrat"/>
-              <a:sym typeface="Montserrat"/>
-            </a:endParaRPr>
-          </a:p>
-          <a:p>
-            <a:pPr marL="0" lvl="0" indent="0" algn="l" rtl="0">
-              <a:spcBef>
-                <a:spcPts val="0"/>
-              </a:spcBef>
-              <a:spcAft>
-                <a:spcPts val="1200"/>
-              </a:spcAft>
-              <a:buNone/>
-            </a:pPr>
             <a:r>
-              <a:rPr lang="en" dirty="0" smtClean="0">
+              <a:rPr lang="en" dirty="0">
                 <a:solidFill>
                   <a:schemeClr val="dk1"/>
                 </a:solidFill>
@@ -35131,14 +35137,13 @@
               </a:rPr>
               <a:t>Scrum trainer</a:t>
             </a:r>
-            <a:endParaRPr dirty="0">
+            <a:endParaRPr lang="en-US" dirty="0">
               <a:solidFill>
                 <a:schemeClr val="dk1"/>
               </a:solidFill>
               <a:latin typeface="Montserrat"/>
               <a:ea typeface="Montserrat"/>
               <a:cs typeface="Montserrat"/>
-              <a:sym typeface="Montserrat"/>
             </a:endParaRPr>
           </a:p>
         </p:txBody>
@@ -35151,7 +35156,7 @@
         </p:nvSpPr>
         <p:spPr>
           <a:xfrm>
-            <a:off x="720000" y="2768725"/>
+            <a:off x="692458" y="3271370"/>
             <a:ext cx="2257978" cy="320100"/>
           </a:xfrm>
           <a:prstGeom prst="rect">
@@ -35178,7 +35183,7 @@
               <a:buNone/>
             </a:pPr>
             <a:r>
-              <a:rPr lang="en-US" sz="2200" b="1" dirty="0" smtClean="0">
+              <a:rPr lang="en-US" sz="2200" b="1" dirty="0">
                 <a:solidFill>
                   <a:schemeClr val="dk1"/>
                 </a:solidFill>
@@ -35187,9 +35192,9 @@
                 <a:cs typeface="Titillium Web"/>
                 <a:sym typeface="Titillium Web"/>
               </a:rPr>
-              <a:t>Boyan Kyovtarov</a:t>
+              <a:t>Boyan Kyovtorov</a:t>
             </a:r>
-            <a:endParaRPr sz="2200" b="1" dirty="0">
+            <a:endParaRPr sz="2200" b="1" dirty="0" err="1">
               <a:solidFill>
                 <a:schemeClr val="dk1"/>
               </a:solidFill>
@@ -35209,7 +35214,7 @@
         </p:nvSpPr>
         <p:spPr>
           <a:xfrm>
-            <a:off x="719999" y="3041470"/>
+            <a:off x="754427" y="3544115"/>
             <a:ext cx="3382443" cy="852900"/>
           </a:xfrm>
           <a:prstGeom prst="rect">
@@ -35232,7 +35237,7 @@
               </a:spcAft>
             </a:pPr>
             <a:r>
-              <a:rPr lang="en-US" dirty="0" smtClean="0">
+              <a:rPr lang="en-US" dirty="0">
                 <a:solidFill>
                   <a:schemeClr val="dk1"/>
                 </a:solidFill>
@@ -35244,27 +35249,15 @@
               <a:t>BKKyovtorov21@codingburgas.bg</a:t>
             </a:r>
             <a:r>
-              <a:rPr lang="en-US" dirty="0" smtClean="0">
+              <a:rPr lang="en-US" dirty="0">
                 <a:solidFill>
                   <a:srgbClr val="FF0000"/>
                 </a:solidFill>
               </a:rPr>
               <a:t> </a:t>
             </a:r>
-            <a:r>
-              <a:rPr lang="en" dirty="0" smtClean="0">
-                <a:solidFill>
-                  <a:schemeClr val="dk1"/>
-                </a:solidFill>
-                <a:latin typeface="Montserrat"/>
-                <a:ea typeface="Montserrat"/>
-                <a:cs typeface="Montserrat"/>
-                <a:sym typeface="Montserrat"/>
-              </a:rPr>
-              <a:t/>
-            </a:r>
             <a:br>
-              <a:rPr lang="en" dirty="0" smtClean="0">
+              <a:rPr lang="en" dirty="0">
                 <a:solidFill>
                   <a:schemeClr val="dk1"/>
                 </a:solidFill>
@@ -35275,7 +35268,7 @@
               </a:rPr>
             </a:br>
             <a:r>
-              <a:rPr lang="en" dirty="0" smtClean="0">
+              <a:rPr lang="en" dirty="0">
                 <a:solidFill>
                   <a:schemeClr val="dk1"/>
                 </a:solidFill>
@@ -35324,7 +35317,7 @@
           <a:lstStyle/>
           <a:p>
             <a:r>
-              <a:rPr lang="en-US" sz="2200" b="1" dirty="0" smtClean="0">
+              <a:rPr lang="en-US" sz="2200" b="1" dirty="0">
                 <a:solidFill>
                   <a:schemeClr val="dk1"/>
                 </a:solidFill>
@@ -35364,7 +35357,7 @@
           <a:lstStyle/>
           <a:p>
             <a:r>
-              <a:rPr lang="en-US" dirty="0" smtClean="0">
+              <a:rPr lang="en-US" dirty="0">
                 <a:solidFill>
                   <a:schemeClr val="dk1"/>
                 </a:solidFill>
@@ -35378,7 +35371,7 @@
           </a:p>
           <a:p>
             <a:r>
-              <a:rPr lang="en-US" dirty="0" smtClean="0">
+              <a:rPr lang="en-US" dirty="0">
                 <a:solidFill>
                   <a:schemeClr val="dk1"/>
                 </a:solidFill>
@@ -35389,7 +35382,7 @@
               </a:rPr>
               <a:t>Front  end</a:t>
             </a:r>
-            <a:endParaRPr lang="bg-BG" dirty="0" smtClean="0">
+            <a:endParaRPr lang="bg-BG" dirty="0">
               <a:solidFill>
                 <a:schemeClr val="dk1"/>
               </a:solidFill>
@@ -35409,7 +35402,7 @@
         </p:nvSpPr>
         <p:spPr>
           <a:xfrm>
-            <a:off x="6839346" y="2867580"/>
+            <a:off x="6825575" y="3322026"/>
             <a:ext cx="2069876" cy="320100"/>
           </a:xfrm>
           <a:prstGeom prst="rect">
@@ -35428,7 +35421,7 @@
           <a:p>
             <a:pPr algn="r"/>
             <a:r>
-              <a:rPr lang="en-US" sz="2200" b="1" dirty="0" smtClean="0">
+              <a:rPr lang="en-US" sz="2200" b="1" dirty="0">
                 <a:solidFill>
                   <a:schemeClr val="dk1"/>
                 </a:solidFill>
@@ -35443,7 +35436,7 @@
           <a:p>
             <a:pPr algn="r"/>
             <a:r>
-              <a:rPr lang="en-US" sz="2200" b="1" dirty="0" smtClean="0">
+              <a:rPr lang="en-US" sz="2200" b="1" dirty="0">
                 <a:solidFill>
                   <a:schemeClr val="dk1"/>
                 </a:solidFill>
@@ -35485,7 +35478,7 @@
         </p:nvSpPr>
         <p:spPr>
           <a:xfrm>
-            <a:off x="6172201" y="3041470"/>
+            <a:off x="6158430" y="3495916"/>
             <a:ext cx="2971800" cy="852900"/>
           </a:xfrm>
           <a:prstGeom prst="rect">
@@ -35503,7 +35496,7 @@
           <a:lstStyle/>
           <a:p>
             <a:r>
-              <a:rPr lang="en-US" dirty="0" smtClean="0">
+              <a:rPr lang="en-US" dirty="0">
                 <a:solidFill>
                   <a:schemeClr val="dk1"/>
                 </a:solidFill>
@@ -35517,7 +35510,7 @@
           </a:p>
           <a:p>
             <a:r>
-              <a:rPr lang="en-US" dirty="0" smtClean="0">
+              <a:rPr lang="en-US" dirty="0">
                 <a:solidFill>
                   <a:schemeClr val="dk1"/>
                 </a:solidFill>
@@ -35528,7 +35521,7 @@
               </a:rPr>
               <a:t>Designer</a:t>
             </a:r>
-            <a:endParaRPr lang="bg-BG" dirty="0" smtClean="0">
+            <a:endParaRPr lang="bg-BG" dirty="0">
               <a:solidFill>
                 <a:schemeClr val="dk1"/>
               </a:solidFill>
@@ -35840,7 +35833,7 @@
       </p:pic>
       <p:pic>
         <p:nvPicPr>
-          <p:cNvPr id="24" name="Picture 6"/>
+          <p:cNvPr id="25" name="Picture 11"/>
           <p:cNvPicPr>
             <a:picLocks noChangeAspect="1" noChangeArrowheads="1"/>
           </p:cNvPicPr>
@@ -35855,40 +35848,8 @@
         </p:blipFill>
         <p:spPr bwMode="auto">
           <a:xfrm>
-            <a:off x="2876673" y="2242751"/>
-            <a:ext cx="864984" cy="864984"/>
-          </a:xfrm>
-          <a:prstGeom prst="rect">
-            <a:avLst/>
-          </a:prstGeom>
-          <a:noFill/>
-          <a:ln w="9525">
-            <a:noFill/>
-            <a:miter lim="800000"/>
-            <a:headEnd/>
-            <a:tailEnd/>
-          </a:ln>
-        </p:spPr>
-      </p:pic>
-      <p:pic>
-        <p:nvPicPr>
-          <p:cNvPr id="25" name="Picture 11"/>
-          <p:cNvPicPr>
-            <a:picLocks noChangeAspect="1" noChangeArrowheads="1"/>
-          </p:cNvPicPr>
-          <p:nvPr/>
-        </p:nvPicPr>
-        <p:blipFill>
-          <a:blip r:embed="rId6"/>
-          <a:srcRect/>
-          <a:stretch>
-            <a:fillRect/>
-          </a:stretch>
-        </p:blipFill>
-        <p:spPr bwMode="auto">
-          <a:xfrm>
-            <a:off x="6266350" y="682263"/>
-            <a:ext cx="936104" cy="1080120"/>
+            <a:off x="6266350" y="902600"/>
+            <a:ext cx="936104" cy="852898"/>
           </a:xfrm>
           <a:prstGeom prst="rect">
             <a:avLst/>
@@ -35911,7 +35872,7 @@
           <p:nvPr/>
         </p:nvPicPr>
         <p:blipFill>
-          <a:blip r:embed="rId7"/>
+          <a:blip r:embed="rId6"/>
           <a:srcRect/>
           <a:stretch>
             <a:fillRect/>
@@ -35919,13 +35880,43 @@
         </p:blipFill>
         <p:spPr bwMode="auto">
           <a:xfrm>
-            <a:off x="6346669" y="2233414"/>
+            <a:off x="6332898" y="2687860"/>
             <a:ext cx="914400" cy="914401"/>
           </a:xfrm>
           <a:prstGeom prst="rect">
             <a:avLst/>
           </a:prstGeom>
           <a:noFill/>
+        </p:spPr>
+      </p:pic>
+      <p:pic>
+        <p:nvPicPr>
+          <p:cNvPr id="3" name="Picture 2" descr="A person posing for the camera&#10;&#10;Description automatically generated">
+            <a:extLst>
+              <a:ext uri="{FF2B5EF4-FFF2-40B4-BE49-F238E27FC236}">
+                <a16:creationId xmlns:a16="http://schemas.microsoft.com/office/drawing/2014/main" id="{D5A7A38D-A332-6B81-650C-4F8355F090E6}"/>
+              </a:ext>
+            </a:extLst>
+          </p:cNvPr>
+          <p:cNvPicPr>
+            <a:picLocks noChangeAspect="1"/>
+          </p:cNvPicPr>
+          <p:nvPr/>
+        </p:nvPicPr>
+        <p:blipFill>
+          <a:blip r:embed="rId7"/>
+          <a:stretch>
+            <a:fillRect/>
+          </a:stretch>
+        </p:blipFill>
+        <p:spPr>
+          <a:xfrm>
+            <a:off x="2962639" y="2626146"/>
+            <a:ext cx="912071" cy="910270"/>
+          </a:xfrm>
+          <a:prstGeom prst="rect">
+            <a:avLst/>
+          </a:prstGeom>
         </p:spPr>
       </p:pic>
     </p:spTree>
@@ -35937,6 +35928,421 @@
 </file>
 
 <file path=ppt/slides/slide3.xml><?xml version="1.0" encoding="utf-8"?>
+<p:sld xmlns:a="http://schemas.openxmlformats.org/drawingml/2006/main" xmlns:r="http://schemas.openxmlformats.org/officeDocument/2006/relationships" xmlns:p="http://schemas.openxmlformats.org/presentationml/2006/main">
+  <p:cSld>
+    <p:spTree>
+      <p:nvGrpSpPr>
+        <p:cNvPr id="1" name="Shape 1534"/>
+        <p:cNvGrpSpPr/>
+        <p:nvPr/>
+      </p:nvGrpSpPr>
+      <p:grpSpPr>
+        <a:xfrm>
+          <a:off x="0" y="0"/>
+          <a:ext cx="0" cy="0"/>
+          <a:chOff x="0" y="0"/>
+          <a:chExt cx="0" cy="0"/>
+        </a:xfrm>
+      </p:grpSpPr>
+      <p:sp>
+        <p:nvSpPr>
+          <p:cNvPr id="1539" name="Google Shape;1539;p61"/>
+          <p:cNvSpPr txBox="1">
+            <a:spLocks noGrp="1"/>
+          </p:cNvSpPr>
+          <p:nvPr>
+            <p:ph type="title"/>
+          </p:nvPr>
+        </p:nvSpPr>
+        <p:spPr>
+          <a:xfrm>
+            <a:off x="637373" y="-36963"/>
+            <a:ext cx="7704000" cy="572700"/>
+          </a:xfrm>
+          <a:prstGeom prst="rect">
+            <a:avLst/>
+          </a:prstGeom>
+        </p:spPr>
+        <p:txBody>
+          <a:bodyPr spcFirstLastPara="1" wrap="square" lIns="91425" tIns="91425" rIns="91425" bIns="91425" anchor="ctr" anchorCtr="0">
+            <a:noAutofit/>
+          </a:bodyPr>
+          <a:lstStyle/>
+          <a:p>
+            <a:pPr marL="0" lvl="0" indent="0" algn="ctr" rtl="0">
+              <a:spcBef>
+                <a:spcPts val="0"/>
+              </a:spcBef>
+              <a:spcAft>
+                <a:spcPts val="0"/>
+              </a:spcAft>
+              <a:buNone/>
+            </a:pPr>
+            <a:r>
+              <a:rPr lang="en" dirty="0"/>
+              <a:t>Used technologies</a:t>
+            </a:r>
+            <a:endParaRPr dirty="0"/>
+          </a:p>
+        </p:txBody>
+      </p:sp>
+      <p:pic>
+        <p:nvPicPr>
+          <p:cNvPr id="68" name="Picture 15" descr="Icon&#10;&#10;Description automatically generated">
+            <a:extLst>
+              <a:ext uri="{FF2B5EF4-FFF2-40B4-BE49-F238E27FC236}">
+                <a16:creationId xmlns:a16="http://schemas.microsoft.com/office/drawing/2014/main" id="{ACFAC17E-DC42-270D-71D5-41F319D54F6F}"/>
+              </a:ext>
+            </a:extLst>
+          </p:cNvPr>
+          <p:cNvPicPr>
+            <a:picLocks noChangeAspect="1"/>
+          </p:cNvPicPr>
+          <p:nvPr/>
+        </p:nvPicPr>
+        <p:blipFill>
+          <a:blip r:embed="rId3"/>
+          <a:stretch>
+            <a:fillRect/>
+          </a:stretch>
+        </p:blipFill>
+        <p:spPr>
+          <a:xfrm>
+            <a:off x="1056408" y="1055644"/>
+            <a:ext cx="1511521" cy="863961"/>
+          </a:xfrm>
+          <a:prstGeom prst="rect">
+            <a:avLst/>
+          </a:prstGeom>
+        </p:spPr>
+      </p:pic>
+      <p:pic>
+        <p:nvPicPr>
+          <p:cNvPr id="69" name="Picture 17487" descr="Icon&#10;&#10;Description automatically generated">
+            <a:extLst>
+              <a:ext uri="{FF2B5EF4-FFF2-40B4-BE49-F238E27FC236}">
+                <a16:creationId xmlns:a16="http://schemas.microsoft.com/office/drawing/2014/main" id="{A09F094F-126D-B49A-62FA-DDBDCB87980B}"/>
+              </a:ext>
+            </a:extLst>
+          </p:cNvPr>
+          <p:cNvPicPr>
+            <a:picLocks noChangeAspect="1"/>
+          </p:cNvPicPr>
+          <p:nvPr/>
+        </p:nvPicPr>
+        <p:blipFill>
+          <a:blip r:embed="rId4"/>
+          <a:stretch>
+            <a:fillRect/>
+          </a:stretch>
+        </p:blipFill>
+        <p:spPr>
+          <a:xfrm>
+            <a:off x="3703340" y="1778831"/>
+            <a:ext cx="1803324" cy="997561"/>
+          </a:xfrm>
+          <a:prstGeom prst="rect">
+            <a:avLst/>
+          </a:prstGeom>
+        </p:spPr>
+      </p:pic>
+      <p:pic>
+        <p:nvPicPr>
+          <p:cNvPr id="70" name="Picture 27" descr="Graphical user interface, icon&#10;&#10;Description automatically generated">
+            <a:extLst>
+              <a:ext uri="{FF2B5EF4-FFF2-40B4-BE49-F238E27FC236}">
+                <a16:creationId xmlns:a16="http://schemas.microsoft.com/office/drawing/2014/main" id="{DF6DB32C-507B-1507-0B1C-3F06DE2D57F8}"/>
+              </a:ext>
+            </a:extLst>
+          </p:cNvPr>
+          <p:cNvPicPr>
+            <a:picLocks noChangeAspect="1"/>
+          </p:cNvPicPr>
+          <p:nvPr/>
+        </p:nvPicPr>
+        <p:blipFill>
+          <a:blip r:embed="rId5"/>
+          <a:stretch>
+            <a:fillRect/>
+          </a:stretch>
+        </p:blipFill>
+        <p:spPr>
+          <a:xfrm>
+            <a:off x="3898707" y="3310494"/>
+            <a:ext cx="1486565" cy="952650"/>
+          </a:xfrm>
+          <a:prstGeom prst="rect">
+            <a:avLst/>
+          </a:prstGeom>
+        </p:spPr>
+      </p:pic>
+      <p:pic>
+        <p:nvPicPr>
+          <p:cNvPr id="71" name="Picture 17488" descr="Logo&#10;&#10;Description automatically generated">
+            <a:extLst>
+              <a:ext uri="{FF2B5EF4-FFF2-40B4-BE49-F238E27FC236}">
+                <a16:creationId xmlns:a16="http://schemas.microsoft.com/office/drawing/2014/main" id="{867EDDD9-5662-D863-DAAB-371F8554597F}"/>
+              </a:ext>
+            </a:extLst>
+          </p:cNvPr>
+          <p:cNvPicPr>
+            <a:picLocks noChangeAspect="1"/>
+          </p:cNvPicPr>
+          <p:nvPr/>
+        </p:nvPicPr>
+        <p:blipFill>
+          <a:blip r:embed="rId6"/>
+          <a:stretch>
+            <a:fillRect/>
+          </a:stretch>
+        </p:blipFill>
+        <p:spPr>
+          <a:xfrm>
+            <a:off x="7318091" y="3307922"/>
+            <a:ext cx="1200999" cy="1227820"/>
+          </a:xfrm>
+          <a:prstGeom prst="rect">
+            <a:avLst/>
+          </a:prstGeom>
+        </p:spPr>
+      </p:pic>
+      <p:pic>
+        <p:nvPicPr>
+          <p:cNvPr id="72" name="Picture 2" descr="Github Logo - Free social media icons"/>
+          <p:cNvPicPr>
+            <a:picLocks noChangeAspect="1" noChangeArrowheads="1"/>
+          </p:cNvPicPr>
+          <p:nvPr/>
+        </p:nvPicPr>
+        <p:blipFill>
+          <a:blip r:embed="rId7"/>
+          <a:srcRect/>
+          <a:stretch>
+            <a:fillRect/>
+          </a:stretch>
+        </p:blipFill>
+        <p:spPr bwMode="auto">
+          <a:xfrm>
+            <a:off x="6083917" y="2935271"/>
+            <a:ext cx="955933" cy="949049"/>
+          </a:xfrm>
+          <a:prstGeom prst="rect">
+            <a:avLst/>
+          </a:prstGeom>
+          <a:noFill/>
+        </p:spPr>
+      </p:pic>
+      <p:pic>
+        <p:nvPicPr>
+          <p:cNvPr id="74" name="Picture 39" descr="Icon&#10;&#10;Description automatically generated">
+            <a:extLst>
+              <a:ext uri="{FF2B5EF4-FFF2-40B4-BE49-F238E27FC236}">
+                <a16:creationId xmlns:a16="http://schemas.microsoft.com/office/drawing/2014/main" id="{BB6B358D-7D79-6CA4-D58B-AE3DCE2988F2}"/>
+              </a:ext>
+            </a:extLst>
+          </p:cNvPr>
+          <p:cNvPicPr>
+            <a:picLocks noChangeAspect="1"/>
+          </p:cNvPicPr>
+          <p:nvPr/>
+        </p:nvPicPr>
+        <p:blipFill>
+          <a:blip r:embed="rId8"/>
+          <a:stretch>
+            <a:fillRect/>
+          </a:stretch>
+        </p:blipFill>
+        <p:spPr>
+          <a:xfrm>
+            <a:off x="587433" y="3662941"/>
+            <a:ext cx="1873597" cy="1053702"/>
+          </a:xfrm>
+          <a:prstGeom prst="rect">
+            <a:avLst/>
+          </a:prstGeom>
+        </p:spPr>
+      </p:pic>
+      <p:pic>
+        <p:nvPicPr>
+          <p:cNvPr id="75" name="Picture 16" descr="Icon&#10;&#10;Description automatically generated">
+            <a:extLst>
+              <a:ext uri="{FF2B5EF4-FFF2-40B4-BE49-F238E27FC236}">
+                <a16:creationId xmlns:a16="http://schemas.microsoft.com/office/drawing/2014/main" id="{59F2A76D-1CAC-62F8-DB22-A5F83C84C200}"/>
+              </a:ext>
+            </a:extLst>
+          </p:cNvPr>
+          <p:cNvPicPr>
+            <a:picLocks noChangeAspect="1"/>
+          </p:cNvPicPr>
+          <p:nvPr/>
+        </p:nvPicPr>
+        <p:blipFill>
+          <a:blip r:embed="rId9"/>
+          <a:stretch>
+            <a:fillRect/>
+          </a:stretch>
+        </p:blipFill>
+        <p:spPr>
+          <a:xfrm>
+            <a:off x="7105800" y="1110933"/>
+            <a:ext cx="1618347" cy="1024604"/>
+          </a:xfrm>
+          <a:prstGeom prst="rect">
+            <a:avLst/>
+          </a:prstGeom>
+        </p:spPr>
+      </p:pic>
+      <p:pic>
+        <p:nvPicPr>
+          <p:cNvPr id="4098" name="Picture 2" descr="https://camo.githubusercontent.com/ec7c4363f7fbc7171e8e52128f6606a729d649ad0687604e89e3875895ec6312/68747470733a2f2f75706c6f61642e77696b696d656469612e6f72672f77696b6970656469612f636f6d6d6f6e732f7468756d622f632f63332f507974686f6e2d6c6f676f2d6e6f746578742e7376672f3138363970782d507974686f6e2d6c6f676f2d6e6f746578742e7376672e706e67"/>
+          <p:cNvPicPr>
+            <a:picLocks noChangeAspect="1" noChangeArrowheads="1"/>
+          </p:cNvPicPr>
+          <p:nvPr/>
+        </p:nvPicPr>
+        <p:blipFill>
+          <a:blip r:embed="rId10"/>
+          <a:srcRect/>
+          <a:stretch>
+            <a:fillRect/>
+          </a:stretch>
+        </p:blipFill>
+        <p:spPr bwMode="auto">
+          <a:xfrm>
+            <a:off x="561412" y="2275670"/>
+            <a:ext cx="1101048" cy="1224304"/>
+          </a:xfrm>
+          <a:prstGeom prst="rect">
+            <a:avLst/>
+          </a:prstGeom>
+          <a:noFill/>
+        </p:spPr>
+      </p:pic>
+      <p:pic>
+        <p:nvPicPr>
+          <p:cNvPr id="4100" name="Picture 4" descr="https://camo.githubusercontent.com/c2dc1048a970cff3b35b86be32c8f9acc31499aca4cdc4ea0b6747672c37e5c1/68747470733a2f2f75706c6f61642e77696b696d656469612e6f72672f77696b6970656469612f636f6d6d6f6e732f7468756d622f302f30622f51745f6c6f676f5f323031362e7376672f3235363070782d51745f6c6f676f5f323031362e7376672e706e67"/>
+          <p:cNvPicPr>
+            <a:picLocks noChangeAspect="1" noChangeArrowheads="1"/>
+          </p:cNvPicPr>
+          <p:nvPr/>
+        </p:nvPicPr>
+        <p:blipFill>
+          <a:blip r:embed="rId11"/>
+          <a:srcRect/>
+          <a:stretch>
+            <a:fillRect/>
+          </a:stretch>
+        </p:blipFill>
+        <p:spPr bwMode="auto">
+          <a:xfrm>
+            <a:off x="2441154" y="2797693"/>
+            <a:ext cx="1182944" cy="868731"/>
+          </a:xfrm>
+          <a:prstGeom prst="rect">
+            <a:avLst/>
+          </a:prstGeom>
+          <a:noFill/>
+        </p:spPr>
+      </p:pic>
+      <p:pic>
+        <p:nvPicPr>
+          <p:cNvPr id="2" name="Picture 1" descr="A blue logo with a triangle&#10;&#10;Description automatically generated">
+            <a:extLst>
+              <a:ext uri="{FF2B5EF4-FFF2-40B4-BE49-F238E27FC236}">
+                <a16:creationId xmlns:a16="http://schemas.microsoft.com/office/drawing/2014/main" id="{CAC2A334-93DA-5F1B-85AE-CEDAB84F337C}"/>
+              </a:ext>
+            </a:extLst>
+          </p:cNvPr>
+          <p:cNvPicPr>
+            <a:picLocks noChangeAspect="1"/>
+          </p:cNvPicPr>
+          <p:nvPr/>
+        </p:nvPicPr>
+        <p:blipFill>
+          <a:blip r:embed="rId12"/>
+          <a:stretch>
+            <a:fillRect/>
+          </a:stretch>
+        </p:blipFill>
+        <p:spPr>
+          <a:xfrm>
+            <a:off x="37871" y="1231136"/>
+            <a:ext cx="1094802" cy="615567"/>
+          </a:xfrm>
+          <a:prstGeom prst="rect">
+            <a:avLst/>
+          </a:prstGeom>
+        </p:spPr>
+      </p:pic>
+      <p:pic>
+        <p:nvPicPr>
+          <p:cNvPr id="3" name="Picture 2" descr="A red and white logo&#10;&#10;Description automatically generated">
+            <a:extLst>
+              <a:ext uri="{FF2B5EF4-FFF2-40B4-BE49-F238E27FC236}">
+                <a16:creationId xmlns:a16="http://schemas.microsoft.com/office/drawing/2014/main" id="{83774CFF-949A-94CC-B00A-3C0E04D8A146}"/>
+              </a:ext>
+            </a:extLst>
+          </p:cNvPr>
+          <p:cNvPicPr>
+            <a:picLocks noChangeAspect="1"/>
+          </p:cNvPicPr>
+          <p:nvPr/>
+        </p:nvPicPr>
+        <p:blipFill>
+          <a:blip r:embed="rId13"/>
+          <a:stretch>
+            <a:fillRect/>
+          </a:stretch>
+        </p:blipFill>
+        <p:spPr>
+          <a:xfrm>
+            <a:off x="6006774" y="319316"/>
+            <a:ext cx="1020783" cy="1020783"/>
+          </a:xfrm>
+          <a:prstGeom prst="rect">
+            <a:avLst/>
+          </a:prstGeom>
+        </p:spPr>
+      </p:pic>
+      <p:pic>
+        <p:nvPicPr>
+          <p:cNvPr id="4" name="Picture 3" descr="A logo with a dolphin&#10;&#10;Description automatically generated">
+            <a:extLst>
+              <a:ext uri="{FF2B5EF4-FFF2-40B4-BE49-F238E27FC236}">
+                <a16:creationId xmlns:a16="http://schemas.microsoft.com/office/drawing/2014/main" id="{8C8A60A0-023F-15AC-628A-7DA2EB364528}"/>
+              </a:ext>
+            </a:extLst>
+          </p:cNvPr>
+          <p:cNvPicPr>
+            <a:picLocks noChangeAspect="1"/>
+          </p:cNvPicPr>
+          <p:nvPr/>
+        </p:nvPicPr>
+        <p:blipFill>
+          <a:blip r:embed="rId14"/>
+          <a:stretch>
+            <a:fillRect/>
+          </a:stretch>
+        </p:blipFill>
+        <p:spPr>
+          <a:xfrm>
+            <a:off x="3666953" y="621648"/>
+            <a:ext cx="1486474" cy="781051"/>
+          </a:xfrm>
+          <a:prstGeom prst="rect">
+            <a:avLst/>
+          </a:prstGeom>
+        </p:spPr>
+      </p:pic>
+    </p:spTree>
+  </p:cSld>
+  <p:clrMapOvr>
+    <a:masterClrMapping/>
+  </p:clrMapOvr>
+</p:sld>
+</file>
+
+<file path=ppt/slides/slide4.xml><?xml version="1.0" encoding="utf-8"?>
 <p:sld xmlns:a="http://schemas.openxmlformats.org/drawingml/2006/main" xmlns:r="http://schemas.openxmlformats.org/officeDocument/2006/relationships" xmlns:p="http://schemas.openxmlformats.org/presentationml/2006/main">
   <p:cSld>
     <p:bg>
@@ -35997,7 +36403,7 @@
               <a:buNone/>
             </a:pPr>
             <a:r>
-              <a:rPr lang="en" dirty="0" smtClean="0"/>
+              <a:rPr lang="en" dirty="0"/>
               <a:t>The process</a:t>
             </a:r>
             <a:endParaRPr dirty="0"/>
@@ -36039,7 +36445,7 @@
               <a:buNone/>
             </a:pPr>
             <a:r>
-              <a:rPr lang="en" dirty="0" smtClean="0"/>
+              <a:rPr lang="en" dirty="0"/>
               <a:t>Brainstorming</a:t>
             </a:r>
             <a:endParaRPr dirty="0"/>
@@ -36124,7 +36530,7 @@
               <a:buNone/>
             </a:pPr>
             <a:r>
-              <a:rPr lang="en" dirty="0" smtClean="0"/>
+              <a:rPr lang="en" dirty="0"/>
               <a:t>Have a team meeting</a:t>
             </a:r>
             <a:endParaRPr dirty="0"/>
@@ -36209,7 +36615,7 @@
               <a:buNone/>
             </a:pPr>
             <a:r>
-              <a:rPr lang="en" dirty="0" smtClean="0"/>
+              <a:rPr lang="en" dirty="0"/>
               <a:t>Write the code for the app</a:t>
             </a:r>
             <a:endParaRPr dirty="0"/>
@@ -36294,7 +36700,7 @@
               <a:buNone/>
             </a:pPr>
             <a:r>
-              <a:rPr lang="en-US" dirty="0" smtClean="0"/>
+              <a:rPr lang="en-US" dirty="0"/>
               <a:t>Test all of the functions</a:t>
             </a:r>
             <a:endParaRPr dirty="0"/>
@@ -36379,7 +36785,7 @@
               <a:buNone/>
             </a:pPr>
             <a:r>
-              <a:rPr lang="en-US" dirty="0" smtClean="0"/>
+              <a:rPr lang="en-US" dirty="0"/>
               <a:t>Create documentations</a:t>
             </a:r>
             <a:endParaRPr dirty="0"/>
@@ -36464,7 +36870,7 @@
               <a:buNone/>
             </a:pPr>
             <a:r>
-              <a:rPr lang="en" dirty="0" smtClean="0"/>
+              <a:rPr lang="en" dirty="0"/>
               <a:t>Present</a:t>
             </a:r>
             <a:endParaRPr dirty="0"/>
@@ -46075,12 +46481,12 @@
 </p:sld>
 </file>
 
-<file path=ppt/slides/slide4.xml><?xml version="1.0" encoding="utf-8"?>
+<file path=ppt/slides/slide5.xml><?xml version="1.0" encoding="utf-8"?>
 <p:sld xmlns:a="http://schemas.openxmlformats.org/drawingml/2006/main" xmlns:r="http://schemas.openxmlformats.org/officeDocument/2006/relationships" xmlns:p="http://schemas.openxmlformats.org/presentationml/2006/main">
   <p:cSld>
     <p:spTree>
       <p:nvGrpSpPr>
-        <p:cNvPr id="1" name="Shape 1534"/>
+        <p:cNvPr id="1" name=""/>
         <p:cNvGrpSpPr/>
         <p:nvPr/>
       </p:nvGrpSpPr>
@@ -46094,8 +46500,47 @@
       </p:grpSpPr>
       <p:sp>
         <p:nvSpPr>
-          <p:cNvPr id="1539" name="Google Shape;1539;p61"/>
-          <p:cNvSpPr txBox="1">
+          <p:cNvPr id="4" name="Subtitle 3">
+            <a:extLst>
+              <a:ext uri="{FF2B5EF4-FFF2-40B4-BE49-F238E27FC236}">
+                <a16:creationId xmlns:a16="http://schemas.microsoft.com/office/drawing/2014/main" id="{20B28837-A78B-778E-93E7-9E1562F0207D}"/>
+              </a:ext>
+            </a:extLst>
+          </p:cNvPr>
+          <p:cNvSpPr>
+            <a:spLocks noGrp="1"/>
+          </p:cNvSpPr>
+          <p:nvPr>
+            <p:ph type="subTitle" idx="3"/>
+          </p:nvPr>
+        </p:nvSpPr>
+        <p:spPr>
+          <a:xfrm>
+            <a:off x="2344148" y="801782"/>
+            <a:ext cx="4410028" cy="1577700"/>
+          </a:xfrm>
+        </p:spPr>
+        <p:txBody>
+          <a:bodyPr/>
+          <a:lstStyle/>
+          <a:p>
+            <a:r>
+              <a:rPr lang="en-US" dirty="0"/>
+              <a:t>Our idea is to make a bank application based on digital will where in case of sudden accident all assets will go to a predefined heir </a:t>
+            </a:r>
+          </a:p>
+        </p:txBody>
+      </p:sp>
+      <p:sp>
+        <p:nvSpPr>
+          <p:cNvPr id="6" name="Title 5">
+            <a:extLst>
+              <a:ext uri="{FF2B5EF4-FFF2-40B4-BE49-F238E27FC236}">
+                <a16:creationId xmlns:a16="http://schemas.microsoft.com/office/drawing/2014/main" id="{A417CAAD-5DFE-E106-E4F8-0BB1ACBA2B2D}"/>
+              </a:ext>
+            </a:extLst>
+          </p:cNvPr>
+          <p:cNvSpPr>
             <a:spLocks noGrp="1"/>
           </p:cNvSpPr>
           <p:nvPr>
@@ -46104,295 +46549,27 @@
         </p:nvSpPr>
         <p:spPr>
           <a:xfrm>
-            <a:off x="720000" y="445025"/>
+            <a:off x="699343" y="148947"/>
             <a:ext cx="7704000" cy="572700"/>
           </a:xfrm>
-          <a:prstGeom prst="rect">
-            <a:avLst/>
-          </a:prstGeom>
         </p:spPr>
         <p:txBody>
-          <a:bodyPr spcFirstLastPara="1" wrap="square" lIns="91425" tIns="91425" rIns="91425" bIns="91425" anchor="ctr" anchorCtr="0">
-            <a:noAutofit/>
-          </a:bodyPr>
+          <a:bodyPr/>
           <a:lstStyle/>
           <a:p>
-            <a:pPr marL="0" lvl="0" indent="0" algn="ctr" rtl="0">
-              <a:spcBef>
-                <a:spcPts val="0"/>
-              </a:spcBef>
-              <a:spcAft>
-                <a:spcPts val="0"/>
-              </a:spcAft>
-              <a:buNone/>
-            </a:pPr>
             <a:r>
-              <a:rPr lang="en" dirty="0" smtClean="0"/>
-              <a:t>Used technologies</a:t>
+              <a:rPr lang="en-US" dirty="0"/>
+              <a:t>Our Idea</a:t>
             </a:r>
-            <a:endParaRPr dirty="0"/>
           </a:p>
         </p:txBody>
       </p:sp>
-      <p:pic>
-        <p:nvPicPr>
-          <p:cNvPr id="68" name="Picture 15" descr="Icon&#10;&#10;Description automatically generated">
-            <a:extLst>
-              <a:ext uri="{FF2B5EF4-FFF2-40B4-BE49-F238E27FC236}">
-                <a16:creationId xmlns="" xmlns:a16="http://schemas.microsoft.com/office/drawing/2014/main" id="{ACFAC17E-DC42-270D-71D5-41F319D54F6F}"/>
-              </a:ext>
-            </a:extLst>
-          </p:cNvPr>
-          <p:cNvPicPr>
-            <a:picLocks noChangeAspect="1"/>
-          </p:cNvPicPr>
-          <p:nvPr/>
-        </p:nvPicPr>
-        <p:blipFill>
-          <a:blip r:embed="rId3"/>
-          <a:stretch>
-            <a:fillRect/>
-          </a:stretch>
-        </p:blipFill>
-        <p:spPr>
-          <a:xfrm>
-            <a:off x="1056408" y="814651"/>
-            <a:ext cx="1938424" cy="1104954"/>
-          </a:xfrm>
-          <a:prstGeom prst="rect">
-            <a:avLst/>
-          </a:prstGeom>
-        </p:spPr>
-      </p:pic>
-      <p:pic>
-        <p:nvPicPr>
-          <p:cNvPr id="69" name="Picture 17487" descr="Icon&#10;&#10;Description automatically generated">
-            <a:extLst>
-              <a:ext uri="{FF2B5EF4-FFF2-40B4-BE49-F238E27FC236}">
-                <a16:creationId xmlns="" xmlns:a16="http://schemas.microsoft.com/office/drawing/2014/main" id="{A09F094F-126D-B49A-62FA-DDBDCB87980B}"/>
-              </a:ext>
-            </a:extLst>
-          </p:cNvPr>
-          <p:cNvPicPr>
-            <a:picLocks noChangeAspect="1"/>
-          </p:cNvPicPr>
-          <p:nvPr/>
-        </p:nvPicPr>
-        <p:blipFill>
-          <a:blip r:embed="rId4"/>
-          <a:stretch>
-            <a:fillRect/>
-          </a:stretch>
-        </p:blipFill>
-        <p:spPr>
-          <a:xfrm>
-            <a:off x="3131840" y="1131590"/>
-            <a:ext cx="2457450" cy="1355609"/>
-          </a:xfrm>
-          <a:prstGeom prst="rect">
-            <a:avLst/>
-          </a:prstGeom>
-        </p:spPr>
-      </p:pic>
-      <p:pic>
-        <p:nvPicPr>
-          <p:cNvPr id="70" name="Picture 27" descr="Graphical user interface, icon&#10;&#10;Description automatically generated">
-            <a:extLst>
-              <a:ext uri="{FF2B5EF4-FFF2-40B4-BE49-F238E27FC236}">
-                <a16:creationId xmlns="" xmlns:a16="http://schemas.microsoft.com/office/drawing/2014/main" id="{DF6DB32C-507B-1507-0B1C-3F06DE2D57F8}"/>
-              </a:ext>
-            </a:extLst>
-          </p:cNvPr>
-          <p:cNvPicPr>
-            <a:picLocks noChangeAspect="1"/>
-          </p:cNvPicPr>
-          <p:nvPr/>
-        </p:nvPicPr>
-        <p:blipFill>
-          <a:blip r:embed="rId5"/>
-          <a:stretch>
-            <a:fillRect/>
-          </a:stretch>
-        </p:blipFill>
-        <p:spPr>
-          <a:xfrm>
-            <a:off x="3347864" y="2931790"/>
-            <a:ext cx="2092492" cy="1331354"/>
-          </a:xfrm>
-          <a:prstGeom prst="rect">
-            <a:avLst/>
-          </a:prstGeom>
-        </p:spPr>
-      </p:pic>
-      <p:pic>
-        <p:nvPicPr>
-          <p:cNvPr id="71" name="Picture 17488" descr="Logo&#10;&#10;Description automatically generated">
-            <a:extLst>
-              <a:ext uri="{FF2B5EF4-FFF2-40B4-BE49-F238E27FC236}">
-                <a16:creationId xmlns="" xmlns:a16="http://schemas.microsoft.com/office/drawing/2014/main" id="{867EDDD9-5662-D863-DAAB-371F8554597F}"/>
-              </a:ext>
-            </a:extLst>
-          </p:cNvPr>
-          <p:cNvPicPr>
-            <a:picLocks noChangeAspect="1"/>
-          </p:cNvPicPr>
-          <p:nvPr/>
-        </p:nvPicPr>
-        <p:blipFill>
-          <a:blip r:embed="rId6"/>
-          <a:stretch>
-            <a:fillRect/>
-          </a:stretch>
-        </p:blipFill>
-        <p:spPr>
-          <a:xfrm>
-            <a:off x="6588224" y="2715766"/>
-            <a:ext cx="1786270" cy="1806205"/>
-          </a:xfrm>
-          <a:prstGeom prst="rect">
-            <a:avLst/>
-          </a:prstGeom>
-        </p:spPr>
-      </p:pic>
-      <p:pic>
-        <p:nvPicPr>
-          <p:cNvPr id="72" name="Picture 2" descr="Github Logo - Free social media icons"/>
-          <p:cNvPicPr>
-            <a:picLocks noChangeAspect="1" noChangeArrowheads="1"/>
-          </p:cNvPicPr>
-          <p:nvPr/>
-        </p:nvPicPr>
-        <p:blipFill>
-          <a:blip r:embed="rId7"/>
-          <a:srcRect/>
-          <a:stretch>
-            <a:fillRect/>
-          </a:stretch>
-        </p:blipFill>
-        <p:spPr bwMode="auto">
-          <a:xfrm>
-            <a:off x="5292080" y="2067694"/>
-            <a:ext cx="1348408" cy="1348409"/>
-          </a:xfrm>
-          <a:prstGeom prst="rect">
-            <a:avLst/>
-          </a:prstGeom>
-          <a:noFill/>
-        </p:spPr>
-      </p:pic>
-      <p:pic>
-        <p:nvPicPr>
-          <p:cNvPr id="74" name="Picture 39" descr="Icon&#10;&#10;Description automatically generated">
-            <a:extLst>
-              <a:ext uri="{FF2B5EF4-FFF2-40B4-BE49-F238E27FC236}">
-                <a16:creationId xmlns="" xmlns:a16="http://schemas.microsoft.com/office/drawing/2014/main" id="{BB6B358D-7D79-6CA4-D58B-AE3DCE2988F2}"/>
-              </a:ext>
-            </a:extLst>
-          </p:cNvPr>
-          <p:cNvPicPr>
-            <a:picLocks noChangeAspect="1"/>
-          </p:cNvPicPr>
-          <p:nvPr/>
-        </p:nvPicPr>
-        <p:blipFill>
-          <a:blip r:embed="rId8"/>
-          <a:stretch>
-            <a:fillRect/>
-          </a:stretch>
-        </p:blipFill>
-        <p:spPr>
-          <a:xfrm>
-            <a:off x="573662" y="3304893"/>
-            <a:ext cx="2527723" cy="1411750"/>
-          </a:xfrm>
-          <a:prstGeom prst="rect">
-            <a:avLst/>
-          </a:prstGeom>
-        </p:spPr>
-      </p:pic>
-      <p:pic>
-        <p:nvPicPr>
-          <p:cNvPr id="75" name="Picture 16" descr="Icon&#10;&#10;Description automatically generated">
-            <a:extLst>
-              <a:ext uri="{FF2B5EF4-FFF2-40B4-BE49-F238E27FC236}">
-                <a16:creationId xmlns="" xmlns:a16="http://schemas.microsoft.com/office/drawing/2014/main" id="{59F2A76D-1CAC-62F8-DB22-A5F83C84C200}"/>
-              </a:ext>
-            </a:extLst>
-          </p:cNvPr>
-          <p:cNvPicPr>
-            <a:picLocks noChangeAspect="1"/>
-          </p:cNvPicPr>
-          <p:nvPr/>
-        </p:nvPicPr>
-        <p:blipFill>
-          <a:blip r:embed="rId9"/>
-          <a:stretch>
-            <a:fillRect/>
-          </a:stretch>
-        </p:blipFill>
-        <p:spPr>
-          <a:xfrm>
-            <a:off x="6300192" y="1131590"/>
-            <a:ext cx="2210503" cy="1403308"/>
-          </a:xfrm>
-          <a:prstGeom prst="rect">
-            <a:avLst/>
-          </a:prstGeom>
-        </p:spPr>
-      </p:pic>
-      <p:pic>
-        <p:nvPicPr>
-          <p:cNvPr id="4098" name="Picture 2" descr="https://camo.githubusercontent.com/ec7c4363f7fbc7171e8e52128f6606a729d649ad0687604e89e3875895ec6312/68747470733a2f2f75706c6f61642e77696b696d656469612e6f72672f77696b6970656469612f636f6d6d6f6e732f7468756d622f632f63332f507974686f6e2d6c6f676f2d6e6f746578742e7376672f3138363970782d507974686f6e2d6c6f676f2d6e6f746578742e7376672e706e67"/>
-          <p:cNvPicPr>
-            <a:picLocks noChangeAspect="1" noChangeArrowheads="1"/>
-          </p:cNvPicPr>
-          <p:nvPr/>
-        </p:nvPicPr>
-        <p:blipFill>
-          <a:blip r:embed="rId10"/>
-          <a:srcRect/>
-          <a:stretch>
-            <a:fillRect/>
-          </a:stretch>
-        </p:blipFill>
-        <p:spPr bwMode="auto">
-          <a:xfrm>
-            <a:off x="588954" y="2000249"/>
-            <a:ext cx="1286957" cy="1410213"/>
-          </a:xfrm>
-          <a:prstGeom prst="rect">
-            <a:avLst/>
-          </a:prstGeom>
-          <a:noFill/>
-        </p:spPr>
-      </p:pic>
-      <p:pic>
-        <p:nvPicPr>
-          <p:cNvPr id="4100" name="Picture 4" descr="https://camo.githubusercontent.com/c2dc1048a970cff3b35b86be32c8f9acc31499aca4cdc4ea0b6747672c37e5c1/68747470733a2f2f75706c6f61642e77696b696d656469612e6f72672f77696b6970656469612f636f6d6d6f6e732f7468756d622f302f30622f51745f6c6f676f5f323031362e7376672f3235363070782d51745f6c6f676f5f323031362e7376672e706e67"/>
-          <p:cNvPicPr>
-            <a:picLocks noChangeAspect="1" noChangeArrowheads="1"/>
-          </p:cNvPicPr>
-          <p:nvPr/>
-        </p:nvPicPr>
-        <p:blipFill>
-          <a:blip r:embed="rId11"/>
-          <a:srcRect/>
-          <a:stretch>
-            <a:fillRect/>
-          </a:stretch>
-        </p:blipFill>
-        <p:spPr bwMode="auto">
-          <a:xfrm>
-            <a:off x="2324100" y="2246849"/>
-            <a:ext cx="1231143" cy="903159"/>
-          </a:xfrm>
-          <a:prstGeom prst="rect">
-            <a:avLst/>
-          </a:prstGeom>
-          <a:noFill/>
-        </p:spPr>
-      </p:pic>
     </p:spTree>
+    <p:extLst>
+      <p:ext uri="{BB962C8B-B14F-4D97-AF65-F5344CB8AC3E}">
+        <p14:creationId xmlns:p14="http://schemas.microsoft.com/office/powerpoint/2010/main" val="265625121"/>
+      </p:ext>
+    </p:extLst>
   </p:cSld>
   <p:clrMapOvr>
     <a:masterClrMapping/>
@@ -46400,7 +46577,7 @@
 </p:sld>
 </file>
 
-<file path=ppt/slides/slide5.xml><?xml version="1.0" encoding="utf-8"?>
+<file path=ppt/slides/slide6.xml><?xml version="1.0" encoding="utf-8"?>
 <p:sld xmlns:a="http://schemas.openxmlformats.org/drawingml/2006/main" xmlns:r="http://schemas.openxmlformats.org/officeDocument/2006/relationships" xmlns:p="http://schemas.openxmlformats.org/presentationml/2006/main">
   <p:cSld>
     <p:spTree>
@@ -46452,7 +46629,7 @@
               <a:buNone/>
             </a:pPr>
             <a:r>
-              <a:rPr lang="en-US" dirty="0" smtClean="0"/>
+              <a:rPr lang="en-US" dirty="0"/>
               <a:t>Let’s move to the game</a:t>
             </a:r>
             <a:endParaRPr dirty="0"/>

</xml_diff>